<commit_message>
tidy script and presentation after auckland session
</commit_message>
<xml_diff>
--- a/dive_into_dplyr.pptx
+++ b/dive_into_dplyr.pptx
@@ -10868,7 +10868,7 @@
                 <a:cs typeface="Consolas"/>
                 <a:sym typeface="Consolas"/>
               </a:rPr>
-              <a:t>filter(data = iris, Species== “setosa”)</a:t>
+              <a:t>filter(.data = iris, Species == “setosa”)</a:t>
             </a:r>
             <a:endParaRPr b="1">
               <a:solidFill>
@@ -11355,7 +11355,7 @@
                 <a:cs typeface="Arial"/>
                 <a:sym typeface="Arial"/>
               </a:rPr>
-              <a:t>Picks variables based on their names</a:t>
+              <a:t>Picks variables (columns) based on their names</a:t>
             </a:r>
             <a:endParaRPr>
               <a:solidFill>
@@ -11425,7 +11425,7 @@
                   <a:srgbClr val="88398A"/>
                 </a:solidFill>
               </a:rPr>
-              <a:t>select(data = </a:t>
+              <a:t>select( .data = </a:t>
             </a:r>
             <a:r>
               <a:rPr b="1" lang="en">
@@ -12794,7 +12794,7 @@
                 <a:cs typeface="Consolas"/>
                 <a:sym typeface="Consolas"/>
               </a:rPr>
-              <a:t>arrange(data = iris, Sepal.Length, Sepal.Width)</a:t>
+              <a:t>arrange( .data = iris, Sepal.Length, Sepal.Width)</a:t>
             </a:r>
             <a:endParaRPr b="1">
               <a:solidFill>
@@ -13359,7 +13359,7 @@
                 <a:cs typeface="Arial"/>
                 <a:sym typeface="Arial"/>
               </a:rPr>
-              <a:t>Allows pointed selection based on given criteria</a:t>
+              <a:t>Allows pointed row selection based on given criteria</a:t>
             </a:r>
             <a:endParaRPr>
               <a:solidFill>
@@ -13399,7 +13399,7 @@
                 <a:cs typeface="Arial"/>
                 <a:sym typeface="Arial"/>
               </a:rPr>
-              <a:t>First argument is the dataframe, subsequent arguments are expressions used to filter the dataframe </a:t>
+              <a:t>First argument is the dataframe, subsequent arguments are logical expressions used to filter the dataframe </a:t>
             </a:r>
             <a:br>
               <a:rPr lang="en">
@@ -13433,7 +13433,7 @@
                 <a:cs typeface="Consolas"/>
                 <a:sym typeface="Consolas"/>
               </a:rPr>
-              <a:t>filter(data = iris, Species == “setosa”)</a:t>
+              <a:t>filter( .data = iris, Species == “setosa”)</a:t>
             </a:r>
             <a:endParaRPr b="1">
               <a:solidFill>
@@ -15251,7 +15251,7 @@
                 <a:cs typeface="Arial"/>
                 <a:sym typeface="Arial"/>
               </a:rPr>
-              <a:t>Select the columns that contain Petal and sort by Petal.Width</a:t>
+              <a:t>Select the columns that contain Petal and sort by Petal.Width and then only the first 6 rows</a:t>
             </a:r>
             <a:endParaRPr>
               <a:solidFill>
@@ -16001,7 +16001,7 @@
                 <a:cs typeface="Arial"/>
                 <a:sym typeface="Arial"/>
               </a:rPr>
-              <a:t>reates new variables from existing ones</a:t>
+              <a:t>reates new variables (columns) from existing ones</a:t>
             </a:r>
             <a:endParaRPr>
               <a:solidFill>
@@ -16099,7 +16099,7 @@
                 <a:cs typeface="Consolas"/>
                 <a:sym typeface="Consolas"/>
               </a:rPr>
-              <a:t>iris %&gt;% mutate(petal_area = Petal.Length * Petal.Width)</a:t>
+              <a:t>iris %&gt;% mutate( petal_area = Petal.Length * Petal.Width)</a:t>
             </a:r>
             <a:endParaRPr b="1">
               <a:solidFill>
@@ -16850,7 +16850,7 @@
                 <a:cs typeface="Arial"/>
                 <a:sym typeface="Arial"/>
               </a:rPr>
-              <a:t>Create a new row with a flag showing Petal.Width &gt; Petal.Length</a:t>
+              <a:t>Create a new column with a flag showing Petal.Width &gt; Petal.Length</a:t>
             </a:r>
             <a:endParaRPr>
               <a:solidFill>
@@ -16890,7 +16890,7 @@
                 <a:cs typeface="Arial"/>
                 <a:sym typeface="Arial"/>
               </a:rPr>
-              <a:t>Create a new row with Petal.Width + Sepal.Length</a:t>
+              <a:t>Create a new column with Petal.Width + Sepal.Length</a:t>
             </a:r>
             <a:endParaRPr>
               <a:solidFill>
@@ -16930,7 +16930,7 @@
                 <a:cs typeface="Arial"/>
                 <a:sym typeface="Arial"/>
               </a:rPr>
-              <a:t>Create a new row with the mean of Sepal.Length and then another new row with a flag stating if each row’s Sepal.Length is greater than the mean</a:t>
+              <a:t>Create a new column with the mean of Sepal.Length and then another new column with a flag stating if each row’s Sepal.Length is greater than the mean</a:t>
             </a:r>
             <a:endParaRPr>
               <a:solidFill>
@@ -16970,7 +16970,7 @@
                 <a:cs typeface="Arial"/>
                 <a:sym typeface="Arial"/>
               </a:rPr>
-              <a:t>Create a new row with Sepal.Length buckets (use cut)</a:t>
+              <a:t>Create a new column with Sepal.Length buckets (use cut)</a:t>
             </a:r>
             <a:endParaRPr>
               <a:solidFill>
@@ -17010,7 +17010,7 @@
                 <a:cs typeface="Arial"/>
                 <a:sym typeface="Arial"/>
               </a:rPr>
-              <a:t>Create a new row stating Low when Petal.Width &lt; 0.2, Medium when Petal.Width is between 0.2 and 0.6 and High when Petal.width &gt; 0.6 (use case_when)</a:t>
+              <a:t>Create a new column stating Low when Petal.Width &lt; 0.2, Medium when Petal.Width is between 0.2 and 0.6 and High when Petal.width &gt; 0.6 (use case_when)</a:t>
             </a:r>
             <a:endParaRPr>
               <a:solidFill>
@@ -18261,7 +18261,7 @@
                 <a:cs typeface="Arial"/>
                 <a:sym typeface="Arial"/>
               </a:rPr>
-              <a:t>Create a new row with the mean of Sepal.Length per species </a:t>
+              <a:t>Create a new column with the mean of Sepal.Length per species </a:t>
             </a:r>
             <a:endParaRPr>
               <a:solidFill>
@@ -18980,37 +18980,6 @@
             </a:r>
             <a:endParaRPr>
               <a:solidFill>
-                <a:schemeClr val="dk1"/>
-              </a:solidFill>
-              <a:latin typeface="Arial"/>
-              <a:ea typeface="Arial"/>
-              <a:cs typeface="Arial"/>
-              <a:sym typeface="Arial"/>
-            </a:endParaRPr>
-          </a:p>
-          <a:p>
-            <a:pPr indent="-342900" lvl="0" marL="457200" rtl="0">
-              <a:lnSpc>
-                <a:spcPct val="115000"/>
-              </a:lnSpc>
-              <a:spcBef>
-                <a:spcPts val="0"/>
-              </a:spcBef>
-              <a:spcAft>
-                <a:spcPts val="0"/>
-              </a:spcAft>
-              <a:buClr>
-                <a:srgbClr val="000000"/>
-              </a:buClr>
-              <a:buSzPts val="1800"/>
-              <a:buFont typeface="Arial"/>
-              <a:buChar char="+"/>
-            </a:pPr>
-            <a:r>
-              <a:t/>
-            </a:r>
-            <a:endParaRPr>
-              <a:solidFill>
                 <a:srgbClr val="000000"/>
               </a:solidFill>
               <a:latin typeface="Arial"/>
@@ -19591,7 +19560,7 @@
                 <a:cs typeface="Consolas"/>
                 <a:sym typeface="Consolas"/>
               </a:rPr>
-              <a:t>_at </a:t>
+              <a:t>_all </a:t>
             </a:r>
             <a:r>
               <a:rPr lang="en">
@@ -19655,16 +19624,7 @@
               <a:buNone/>
             </a:pPr>
             <a:r>
-              <a:rPr b="1" lang="en">
-                <a:solidFill>
-                  <a:srgbClr val="88398A"/>
-                </a:solidFill>
-                <a:latin typeface="Consolas"/>
-                <a:ea typeface="Consolas"/>
-                <a:cs typeface="Consolas"/>
-                <a:sym typeface="Consolas"/>
-              </a:rPr>
-              <a:t>https://dcl-2017-04.github.io/curriculum/manip-scoped.html</a:t>
+              <a:t/>
             </a:r>
             <a:endParaRPr>
               <a:solidFill>
@@ -19918,7 +19878,7 @@
                 <a:cs typeface="Consolas"/>
                 <a:sym typeface="Consolas"/>
               </a:rPr>
-              <a:t>summarise_all(data, function)</a:t>
+              <a:t>summarise_all( .tbl, function)</a:t>
             </a:r>
             <a:endParaRPr b="1">
               <a:solidFill>
@@ -19970,7 +19930,7 @@
                 <a:cs typeface="Consolas"/>
                 <a:sym typeface="Consolas"/>
               </a:rPr>
-              <a:t>summarise_all(data, funs(f1, f2))</a:t>
+              <a:t>summarise_all( .tbl, funs(f1, f2))</a:t>
             </a:r>
             <a:endParaRPr b="1">
               <a:solidFill>
@@ -20022,7 +19982,7 @@
                 <a:cs typeface="Consolas"/>
                 <a:sym typeface="Consolas"/>
               </a:rPr>
-              <a:t>summarise_all(data, ~f1(f2(.)))</a:t>
+              <a:t>summarise_all( .tbl, ~f1(f2(.)))</a:t>
             </a:r>
             <a:endParaRPr>
               <a:solidFill>
@@ -20646,7 +20606,7 @@
                 <a:cs typeface="Consolas"/>
                 <a:sym typeface="Consolas"/>
               </a:rPr>
-              <a:t>summarise_at(data, vars(...), function)</a:t>
+              <a:t>summarise_at( .tbl, vars(...), function)</a:t>
             </a:r>
             <a:endParaRPr b="1">
               <a:solidFill>
@@ -21242,7 +21202,7 @@
                 <a:cs typeface="Consolas"/>
                 <a:sym typeface="Consolas"/>
               </a:rPr>
-              <a:t>summarise_if(data, condition, function)</a:t>
+              <a:t>summarise_if( .tbl, condition, function)</a:t>
             </a:r>
             <a:endParaRPr b="1">
               <a:solidFill>
@@ -22069,7 +22029,7 @@
                 <a:cs typeface="Consolas"/>
                 <a:sym typeface="Consolas"/>
               </a:rPr>
-              <a:t>mutate_if(is.character, as.factor)</a:t>
+              <a:t>mutate_if( .tbl, is.character, as.factor)</a:t>
             </a:r>
             <a:endParaRPr b="1">
               <a:solidFill>
@@ -23230,7 +23190,7 @@
                   <a:srgbClr val="000000"/>
                 </a:solidFill>
               </a:rPr>
-              <a:t>Hadley Wickham vignettes and Stanford material</a:t>
+              <a:t>https://github.com/rladiesaustin/R4DS_workshop_series</a:t>
             </a:r>
             <a:endParaRPr>
               <a:solidFill>
@@ -23247,7 +23207,34 @@
                 <a:spcPts val="400"/>
               </a:spcBef>
               <a:spcAft>
+                <a:spcPts val="0"/>
+              </a:spcAft>
+              <a:buNone/>
+            </a:pPr>
+            <a:r>
+              <a:rPr lang="en">
+                <a:solidFill>
+                  <a:srgbClr val="000000"/>
+                </a:solidFill>
+              </a:rPr>
+              <a:t>Hadley Wickham vignettes and Stanford material</a:t>
+            </a:r>
+            <a:endParaRPr>
+              <a:solidFill>
+                <a:srgbClr val="000000"/>
+              </a:solidFill>
+            </a:endParaRPr>
+          </a:p>
+          <a:p>
+            <a:pPr indent="457200" lvl="0" marL="0" rtl="0">
+              <a:lnSpc>
+                <a:spcPct val="115000"/>
+              </a:lnSpc>
+              <a:spcBef>
                 <a:spcPts val="400"/>
+              </a:spcBef>
+              <a:spcAft>
+                <a:spcPts val="1600"/>
               </a:spcAft>
               <a:buNone/>
             </a:pPr>
@@ -23257,7 +23244,7 @@
                   <a:srgbClr val="000000"/>
                 </a:solidFill>
               </a:rPr>
-              <a:t>R-Ladies Auckland for hosting</a:t>
+              <a:t>https://dcl-2017-04.github.io/curriculum/manip-scoped.html</a:t>
             </a:r>
             <a:endParaRPr>
               <a:solidFill>
@@ -24283,7 +24270,7 @@
                 <a:cs typeface="Arial"/>
                 <a:sym typeface="Arial"/>
               </a:rPr>
-              <a:t> picks variables based on their names</a:t>
+              <a:t> picks variables (columns) based on their names</a:t>
             </a:r>
             <a:endParaRPr>
               <a:solidFill>
@@ -24387,7 +24374,7 @@
                 <a:cs typeface="Arial"/>
                 <a:sym typeface="Arial"/>
               </a:rPr>
-              <a:t> allows pointed selection based on given criteria</a:t>
+              <a:t> allows row selection based on given criteria</a:t>
             </a:r>
             <a:endParaRPr>
               <a:solidFill>
@@ -24439,7 +24426,7 @@
                 <a:cs typeface="Arial"/>
                 <a:sym typeface="Arial"/>
               </a:rPr>
-              <a:t> to create new variables from existing ones</a:t>
+              <a:t> creates new variables (columns) from existing ones</a:t>
             </a:r>
             <a:endParaRPr>
               <a:solidFill>
@@ -24581,6 +24568,285 @@
 </file>
 
 <file path=ppt/theme/theme1.xml><?xml version="1.0" encoding="utf-8"?>
+<a:theme xmlns:a="http://schemas.openxmlformats.org/drawingml/2006/main" xmlns:r="http://schemas.openxmlformats.org/officeDocument/2006/relationships" name="R-Ladies Template">
+  <a:themeElements>
+    <a:clrScheme name="Custom 347">
+      <a:dk1>
+        <a:srgbClr val="000000"/>
+      </a:dk1>
+      <a:lt1>
+        <a:srgbClr val="FFFFFF"/>
+      </a:lt1>
+      <a:dk2>
+        <a:srgbClr val="666666"/>
+      </a:dk2>
+      <a:lt2>
+        <a:srgbClr val="CCCCCC"/>
+      </a:lt2>
+      <a:accent1>
+        <a:srgbClr val="3A81BA"/>
+      </a:accent1>
+      <a:accent2>
+        <a:srgbClr val="D89F39"/>
+      </a:accent2>
+      <a:accent3>
+        <a:srgbClr val="8BAB42"/>
+      </a:accent3>
+      <a:accent4>
+        <a:srgbClr val="57A7B5"/>
+      </a:accent4>
+      <a:accent5>
+        <a:srgbClr val="8B81D2"/>
+      </a:accent5>
+      <a:accent6>
+        <a:srgbClr val="963334"/>
+      </a:accent6>
+      <a:hlink>
+        <a:srgbClr val="1155CC"/>
+      </a:hlink>
+      <a:folHlink>
+        <a:srgbClr val="6611CC"/>
+      </a:folHlink>
+    </a:clrScheme>
+    <a:fontScheme name="Office">
+      <a:majorFont>
+        <a:latin typeface="Arial"/>
+        <a:ea typeface=""/>
+        <a:cs typeface=""/>
+        <a:font script="Jpan" typeface="ＭＳ Ｐゴシック"/>
+        <a:font script="Hang" typeface="맑은 고딕"/>
+        <a:font script="Hans" typeface="宋体"/>
+        <a:font script="Hant" typeface="新細明體"/>
+        <a:font script="Arab" typeface="Times New Roman"/>
+        <a:font script="Hebr" typeface="Times New Roman"/>
+        <a:font script="Thai" typeface="Angsana New"/>
+        <a:font script="Ethi" typeface="Nyala"/>
+        <a:font script="Beng" typeface="Vrinda"/>
+        <a:font script="Gujr" typeface="Shruti"/>
+        <a:font script="Khmr" typeface="MoolBoran"/>
+        <a:font script="Knda" typeface="Tunga"/>
+        <a:font script="Guru" typeface="Raavi"/>
+        <a:font script="Cans" typeface="Euphemia"/>
+        <a:font script="Cher" typeface="Plantagenet Cherokee"/>
+        <a:font script="Yiii" typeface="Microsoft Yi Baiti"/>
+        <a:font script="Tibt" typeface="Microsoft Himalaya"/>
+        <a:font script="Thaa" typeface="MV Boli"/>
+        <a:font script="Deva" typeface="Mangal"/>
+        <a:font script="Telu" typeface="Gautami"/>
+        <a:font script="Taml" typeface="Latha"/>
+        <a:font script="Syrc" typeface="Estrangelo Edessa"/>
+        <a:font script="Orya" typeface="Kalinga"/>
+        <a:font script="Mlym" typeface="Kartika"/>
+        <a:font script="Laoo" typeface="DokChampa"/>
+        <a:font script="Sinh" typeface="Iskoola Pota"/>
+        <a:font script="Mong" typeface="Mongolian Baiti"/>
+        <a:font script="Viet" typeface="Times New Roman"/>
+        <a:font script="Uigh" typeface="Microsoft Uighur"/>
+        <a:font script="Geor" typeface="Sylfaen"/>
+      </a:majorFont>
+      <a:minorFont>
+        <a:latin typeface="Arial"/>
+        <a:ea typeface=""/>
+        <a:cs typeface=""/>
+        <a:font script="Jpan" typeface="ＭＳ Ｐゴシック"/>
+        <a:font script="Hang" typeface="맑은 고딕"/>
+        <a:font script="Hans" typeface="宋体"/>
+        <a:font script="Hant" typeface="新細明體"/>
+        <a:font script="Arab" typeface="Arial"/>
+        <a:font script="Hebr" typeface="Arial"/>
+        <a:font script="Thai" typeface="Cordia New"/>
+        <a:font script="Ethi" typeface="Nyala"/>
+        <a:font script="Beng" typeface="Vrinda"/>
+        <a:font script="Gujr" typeface="Shruti"/>
+        <a:font script="Khmr" typeface="DaunPenh"/>
+        <a:font script="Knda" typeface="Tunga"/>
+        <a:font script="Guru" typeface="Raavi"/>
+        <a:font script="Cans" typeface="Euphemia"/>
+        <a:font script="Cher" typeface="Plantagenet Cherokee"/>
+        <a:font script="Yiii" typeface="Microsoft Yi Baiti"/>
+        <a:font script="Tibt" typeface="Microsoft Himalaya"/>
+        <a:font script="Thaa" typeface="MV Boli"/>
+        <a:font script="Deva" typeface="Mangal"/>
+        <a:font script="Telu" typeface="Gautami"/>
+        <a:font script="Taml" typeface="Latha"/>
+        <a:font script="Syrc" typeface="Estrangelo Edessa"/>
+        <a:font script="Orya" typeface="Kalinga"/>
+        <a:font script="Mlym" typeface="Kartika"/>
+        <a:font script="Laoo" typeface="DokChampa"/>
+        <a:font script="Sinh" typeface="Iskoola Pota"/>
+        <a:font script="Mong" typeface="Mongolian Baiti"/>
+        <a:font script="Viet" typeface="Arial"/>
+        <a:font script="Uigh" typeface="Microsoft Uighur"/>
+        <a:font script="Geor" typeface="Sylfaen"/>
+      </a:minorFont>
+    </a:fontScheme>
+    <a:fmtScheme name="Office">
+      <a:fillStyleLst>
+        <a:solidFill>
+          <a:schemeClr val="phClr"/>
+        </a:solidFill>
+        <a:gradFill rotWithShape="1">
+          <a:gsLst>
+            <a:gs pos="0">
+              <a:schemeClr val="phClr">
+                <a:tint val="50000"/>
+                <a:satMod val="300000"/>
+              </a:schemeClr>
+            </a:gs>
+            <a:gs pos="35000">
+              <a:schemeClr val="phClr">
+                <a:tint val="37000"/>
+                <a:satMod val="300000"/>
+              </a:schemeClr>
+            </a:gs>
+            <a:gs pos="100000">
+              <a:schemeClr val="phClr">
+                <a:tint val="15000"/>
+                <a:satMod val="350000"/>
+              </a:schemeClr>
+            </a:gs>
+          </a:gsLst>
+          <a:lin ang="16200000" scaled="1"/>
+        </a:gradFill>
+        <a:gradFill rotWithShape="1">
+          <a:gsLst>
+            <a:gs pos="0">
+              <a:schemeClr val="phClr">
+                <a:tint val="100000"/>
+                <a:shade val="100000"/>
+                <a:satMod val="130000"/>
+              </a:schemeClr>
+            </a:gs>
+            <a:gs pos="100000">
+              <a:schemeClr val="phClr">
+                <a:tint val="50000"/>
+                <a:shade val="100000"/>
+                <a:satMod val="350000"/>
+              </a:schemeClr>
+            </a:gs>
+          </a:gsLst>
+          <a:lin ang="16200000" scaled="0"/>
+        </a:gradFill>
+      </a:fillStyleLst>
+      <a:lnStyleLst>
+        <a:ln w="9525" cap="flat" cmpd="sng" algn="ctr">
+          <a:solidFill>
+            <a:schemeClr val="phClr">
+              <a:shade val="95000"/>
+              <a:satMod val="105000"/>
+            </a:schemeClr>
+          </a:solidFill>
+          <a:prstDash val="solid"/>
+        </a:ln>
+        <a:ln w="25400" cap="flat" cmpd="sng" algn="ctr">
+          <a:solidFill>
+            <a:schemeClr val="phClr"/>
+          </a:solidFill>
+          <a:prstDash val="solid"/>
+        </a:ln>
+        <a:ln w="38100" cap="flat" cmpd="sng" algn="ctr">
+          <a:solidFill>
+            <a:schemeClr val="phClr"/>
+          </a:solidFill>
+          <a:prstDash val="solid"/>
+        </a:ln>
+      </a:lnStyleLst>
+      <a:effectStyleLst>
+        <a:effectStyle>
+          <a:effectLst>
+            <a:outerShdw blurRad="40000" dist="20000" dir="5400000" rotWithShape="0">
+              <a:srgbClr val="000000">
+                <a:alpha val="38000"/>
+              </a:srgbClr>
+            </a:outerShdw>
+          </a:effectLst>
+        </a:effectStyle>
+        <a:effectStyle>
+          <a:effectLst>
+            <a:outerShdw blurRad="40000" dist="23000" dir="5400000" rotWithShape="0">
+              <a:srgbClr val="000000">
+                <a:alpha val="35000"/>
+              </a:srgbClr>
+            </a:outerShdw>
+          </a:effectLst>
+        </a:effectStyle>
+        <a:effectStyle>
+          <a:effectLst>
+            <a:outerShdw blurRad="40000" dist="23000" dir="5400000" rotWithShape="0">
+              <a:srgbClr val="000000">
+                <a:alpha val="35000"/>
+              </a:srgbClr>
+            </a:outerShdw>
+          </a:effectLst>
+          <a:scene3d>
+            <a:camera prst="orthographicFront">
+              <a:rot lat="0" lon="0" rev="0"/>
+            </a:camera>
+            <a:lightRig rig="threePt" dir="t">
+              <a:rot lat="0" lon="0" rev="1200000"/>
+            </a:lightRig>
+          </a:scene3d>
+          <a:sp3d>
+            <a:bevelT w="63500" h="25400"/>
+          </a:sp3d>
+        </a:effectStyle>
+      </a:effectStyleLst>
+      <a:bgFillStyleLst>
+        <a:solidFill>
+          <a:schemeClr val="phClr"/>
+        </a:solidFill>
+        <a:gradFill rotWithShape="1">
+          <a:gsLst>
+            <a:gs pos="0">
+              <a:schemeClr val="phClr">
+                <a:tint val="40000"/>
+                <a:satMod val="350000"/>
+              </a:schemeClr>
+            </a:gs>
+            <a:gs pos="40000">
+              <a:schemeClr val="phClr">
+                <a:tint val="45000"/>
+                <a:shade val="99000"/>
+                <a:satMod val="350000"/>
+              </a:schemeClr>
+            </a:gs>
+            <a:gs pos="100000">
+              <a:schemeClr val="phClr">
+                <a:shade val="20000"/>
+                <a:satMod val="255000"/>
+              </a:schemeClr>
+            </a:gs>
+          </a:gsLst>
+          <a:path path="circle">
+            <a:fillToRect l="50000" t="-80000" r="50000" b="180000"/>
+          </a:path>
+        </a:gradFill>
+        <a:gradFill rotWithShape="1">
+          <a:gsLst>
+            <a:gs pos="0">
+              <a:schemeClr val="phClr">
+                <a:tint val="80000"/>
+                <a:satMod val="300000"/>
+              </a:schemeClr>
+            </a:gs>
+            <a:gs pos="100000">
+              <a:schemeClr val="phClr">
+                <a:shade val="30000"/>
+                <a:satMod val="200000"/>
+              </a:schemeClr>
+            </a:gs>
+          </a:gsLst>
+          <a:path path="circle">
+            <a:fillToRect l="50000" t="50000" r="50000" b="50000"/>
+          </a:path>
+        </a:gradFill>
+      </a:bgFillStyleLst>
+    </a:fmtScheme>
+  </a:themeElements>
+</a:theme>
+</file>
+
+<file path=ppt/theme/theme2.xml><?xml version="1.0" encoding="utf-8"?>
 <a:theme xmlns:a="http://schemas.openxmlformats.org/drawingml/2006/main" xmlns:r="http://schemas.openxmlformats.org/officeDocument/2006/relationships" name="Custom Theme">
   <a:themeElements>
     <a:clrScheme name="Default">
@@ -24857,283 +25123,4 @@
     </a:fmtScheme>
   </a:themeElements>
 </a:theme>
-</file>
-
-<file path=ppt/theme/theme2.xml><?xml version="1.0" encoding="utf-8"?>
-<a:theme xmlns:a="http://schemas.openxmlformats.org/drawingml/2006/main" xmlns:r="http://schemas.openxmlformats.org/officeDocument/2006/relationships" name="R-Ladies Template">
-  <a:themeElements>
-    <a:clrScheme name="Custom 347">
-      <a:dk1>
-        <a:srgbClr val="000000"/>
-      </a:dk1>
-      <a:lt1>
-        <a:srgbClr val="FFFFFF"/>
-      </a:lt1>
-      <a:dk2>
-        <a:srgbClr val="666666"/>
-      </a:dk2>
-      <a:lt2>
-        <a:srgbClr val="CCCCCC"/>
-      </a:lt2>
-      <a:accent1>
-        <a:srgbClr val="3A81BA"/>
-      </a:accent1>
-      <a:accent2>
-        <a:srgbClr val="D89F39"/>
-      </a:accent2>
-      <a:accent3>
-        <a:srgbClr val="8BAB42"/>
-      </a:accent3>
-      <a:accent4>
-        <a:srgbClr val="57A7B5"/>
-      </a:accent4>
-      <a:accent5>
-        <a:srgbClr val="8B81D2"/>
-      </a:accent5>
-      <a:accent6>
-        <a:srgbClr val="963334"/>
-      </a:accent6>
-      <a:hlink>
-        <a:srgbClr val="1155CC"/>
-      </a:hlink>
-      <a:folHlink>
-        <a:srgbClr val="6611CC"/>
-      </a:folHlink>
-    </a:clrScheme>
-    <a:fontScheme name="Office">
-      <a:majorFont>
-        <a:latin typeface="Arial"/>
-        <a:ea typeface=""/>
-        <a:cs typeface=""/>
-        <a:font script="Jpan" typeface="ＭＳ Ｐゴシック"/>
-        <a:font script="Hang" typeface="맑은 고딕"/>
-        <a:font script="Hans" typeface="宋体"/>
-        <a:font script="Hant" typeface="新細明體"/>
-        <a:font script="Arab" typeface="Times New Roman"/>
-        <a:font script="Hebr" typeface="Times New Roman"/>
-        <a:font script="Thai" typeface="Angsana New"/>
-        <a:font script="Ethi" typeface="Nyala"/>
-        <a:font script="Beng" typeface="Vrinda"/>
-        <a:font script="Gujr" typeface="Shruti"/>
-        <a:font script="Khmr" typeface="MoolBoran"/>
-        <a:font script="Knda" typeface="Tunga"/>
-        <a:font script="Guru" typeface="Raavi"/>
-        <a:font script="Cans" typeface="Euphemia"/>
-        <a:font script="Cher" typeface="Plantagenet Cherokee"/>
-        <a:font script="Yiii" typeface="Microsoft Yi Baiti"/>
-        <a:font script="Tibt" typeface="Microsoft Himalaya"/>
-        <a:font script="Thaa" typeface="MV Boli"/>
-        <a:font script="Deva" typeface="Mangal"/>
-        <a:font script="Telu" typeface="Gautami"/>
-        <a:font script="Taml" typeface="Latha"/>
-        <a:font script="Syrc" typeface="Estrangelo Edessa"/>
-        <a:font script="Orya" typeface="Kalinga"/>
-        <a:font script="Mlym" typeface="Kartika"/>
-        <a:font script="Laoo" typeface="DokChampa"/>
-        <a:font script="Sinh" typeface="Iskoola Pota"/>
-        <a:font script="Mong" typeface="Mongolian Baiti"/>
-        <a:font script="Viet" typeface="Times New Roman"/>
-        <a:font script="Uigh" typeface="Microsoft Uighur"/>
-        <a:font script="Geor" typeface="Sylfaen"/>
-      </a:majorFont>
-      <a:minorFont>
-        <a:latin typeface="Arial"/>
-        <a:ea typeface=""/>
-        <a:cs typeface=""/>
-        <a:font script="Jpan" typeface="ＭＳ Ｐゴシック"/>
-        <a:font script="Hang" typeface="맑은 고딕"/>
-        <a:font script="Hans" typeface="宋体"/>
-        <a:font script="Hant" typeface="新細明體"/>
-        <a:font script="Arab" typeface="Arial"/>
-        <a:font script="Hebr" typeface="Arial"/>
-        <a:font script="Thai" typeface="Cordia New"/>
-        <a:font script="Ethi" typeface="Nyala"/>
-        <a:font script="Beng" typeface="Vrinda"/>
-        <a:font script="Gujr" typeface="Shruti"/>
-        <a:font script="Khmr" typeface="DaunPenh"/>
-        <a:font script="Knda" typeface="Tunga"/>
-        <a:font script="Guru" typeface="Raavi"/>
-        <a:font script="Cans" typeface="Euphemia"/>
-        <a:font script="Cher" typeface="Plantagenet Cherokee"/>
-        <a:font script="Yiii" typeface="Microsoft Yi Baiti"/>
-        <a:font script="Tibt" typeface="Microsoft Himalaya"/>
-        <a:font script="Thaa" typeface="MV Boli"/>
-        <a:font script="Deva" typeface="Mangal"/>
-        <a:font script="Telu" typeface="Gautami"/>
-        <a:font script="Taml" typeface="Latha"/>
-        <a:font script="Syrc" typeface="Estrangelo Edessa"/>
-        <a:font script="Orya" typeface="Kalinga"/>
-        <a:font script="Mlym" typeface="Kartika"/>
-        <a:font script="Laoo" typeface="DokChampa"/>
-        <a:font script="Sinh" typeface="Iskoola Pota"/>
-        <a:font script="Mong" typeface="Mongolian Baiti"/>
-        <a:font script="Viet" typeface="Arial"/>
-        <a:font script="Uigh" typeface="Microsoft Uighur"/>
-        <a:font script="Geor" typeface="Sylfaen"/>
-      </a:minorFont>
-    </a:fontScheme>
-    <a:fmtScheme name="Office">
-      <a:fillStyleLst>
-        <a:solidFill>
-          <a:schemeClr val="phClr"/>
-        </a:solidFill>
-        <a:gradFill rotWithShape="1">
-          <a:gsLst>
-            <a:gs pos="0">
-              <a:schemeClr val="phClr">
-                <a:tint val="50000"/>
-                <a:satMod val="300000"/>
-              </a:schemeClr>
-            </a:gs>
-            <a:gs pos="35000">
-              <a:schemeClr val="phClr">
-                <a:tint val="37000"/>
-                <a:satMod val="300000"/>
-              </a:schemeClr>
-            </a:gs>
-            <a:gs pos="100000">
-              <a:schemeClr val="phClr">
-                <a:tint val="15000"/>
-                <a:satMod val="350000"/>
-              </a:schemeClr>
-            </a:gs>
-          </a:gsLst>
-          <a:lin ang="16200000" scaled="1"/>
-        </a:gradFill>
-        <a:gradFill rotWithShape="1">
-          <a:gsLst>
-            <a:gs pos="0">
-              <a:schemeClr val="phClr">
-                <a:tint val="100000"/>
-                <a:shade val="100000"/>
-                <a:satMod val="130000"/>
-              </a:schemeClr>
-            </a:gs>
-            <a:gs pos="100000">
-              <a:schemeClr val="phClr">
-                <a:tint val="50000"/>
-                <a:shade val="100000"/>
-                <a:satMod val="350000"/>
-              </a:schemeClr>
-            </a:gs>
-          </a:gsLst>
-          <a:lin ang="16200000" scaled="0"/>
-        </a:gradFill>
-      </a:fillStyleLst>
-      <a:lnStyleLst>
-        <a:ln w="9525" cap="flat" cmpd="sng" algn="ctr">
-          <a:solidFill>
-            <a:schemeClr val="phClr">
-              <a:shade val="95000"/>
-              <a:satMod val="105000"/>
-            </a:schemeClr>
-          </a:solidFill>
-          <a:prstDash val="solid"/>
-        </a:ln>
-        <a:ln w="25400" cap="flat" cmpd="sng" algn="ctr">
-          <a:solidFill>
-            <a:schemeClr val="phClr"/>
-          </a:solidFill>
-          <a:prstDash val="solid"/>
-        </a:ln>
-        <a:ln w="38100" cap="flat" cmpd="sng" algn="ctr">
-          <a:solidFill>
-            <a:schemeClr val="phClr"/>
-          </a:solidFill>
-          <a:prstDash val="solid"/>
-        </a:ln>
-      </a:lnStyleLst>
-      <a:effectStyleLst>
-        <a:effectStyle>
-          <a:effectLst>
-            <a:outerShdw blurRad="40000" dist="20000" dir="5400000" rotWithShape="0">
-              <a:srgbClr val="000000">
-                <a:alpha val="38000"/>
-              </a:srgbClr>
-            </a:outerShdw>
-          </a:effectLst>
-        </a:effectStyle>
-        <a:effectStyle>
-          <a:effectLst>
-            <a:outerShdw blurRad="40000" dist="23000" dir="5400000" rotWithShape="0">
-              <a:srgbClr val="000000">
-                <a:alpha val="35000"/>
-              </a:srgbClr>
-            </a:outerShdw>
-          </a:effectLst>
-        </a:effectStyle>
-        <a:effectStyle>
-          <a:effectLst>
-            <a:outerShdw blurRad="40000" dist="23000" dir="5400000" rotWithShape="0">
-              <a:srgbClr val="000000">
-                <a:alpha val="35000"/>
-              </a:srgbClr>
-            </a:outerShdw>
-          </a:effectLst>
-          <a:scene3d>
-            <a:camera prst="orthographicFront">
-              <a:rot lat="0" lon="0" rev="0"/>
-            </a:camera>
-            <a:lightRig rig="threePt" dir="t">
-              <a:rot lat="0" lon="0" rev="1200000"/>
-            </a:lightRig>
-          </a:scene3d>
-          <a:sp3d>
-            <a:bevelT w="63500" h="25400"/>
-          </a:sp3d>
-        </a:effectStyle>
-      </a:effectStyleLst>
-      <a:bgFillStyleLst>
-        <a:solidFill>
-          <a:schemeClr val="phClr"/>
-        </a:solidFill>
-        <a:gradFill rotWithShape="1">
-          <a:gsLst>
-            <a:gs pos="0">
-              <a:schemeClr val="phClr">
-                <a:tint val="40000"/>
-                <a:satMod val="350000"/>
-              </a:schemeClr>
-            </a:gs>
-            <a:gs pos="40000">
-              <a:schemeClr val="phClr">
-                <a:tint val="45000"/>
-                <a:shade val="99000"/>
-                <a:satMod val="350000"/>
-              </a:schemeClr>
-            </a:gs>
-            <a:gs pos="100000">
-              <a:schemeClr val="phClr">
-                <a:shade val="20000"/>
-                <a:satMod val="255000"/>
-              </a:schemeClr>
-            </a:gs>
-          </a:gsLst>
-          <a:path path="circle">
-            <a:fillToRect l="50000" t="-80000" r="50000" b="180000"/>
-          </a:path>
-        </a:gradFill>
-        <a:gradFill rotWithShape="1">
-          <a:gsLst>
-            <a:gs pos="0">
-              <a:schemeClr val="phClr">
-                <a:tint val="80000"/>
-                <a:satMod val="300000"/>
-              </a:schemeClr>
-            </a:gs>
-            <a:gs pos="100000">
-              <a:schemeClr val="phClr">
-                <a:shade val="30000"/>
-                <a:satMod val="200000"/>
-              </a:schemeClr>
-            </a:gs>
-          </a:gsLst>
-          <a:path path="circle">
-            <a:fillToRect l="50000" t="50000" r="50000" b="50000"/>
-          </a:path>
-        </a:gradFill>
-      </a:bgFillStyleLst>
-    </a:fmtScheme>
-  </a:themeElements>
-</a:theme>
 </file>
</xml_diff>